<commit_message>
Added a few details to my presentation
</commit_message>
<xml_diff>
--- a/Supporting Documentation/W8PR Presentation.pptx
+++ b/Supporting Documentation/W8PR Presentation.pptx
@@ -11,6 +11,7 @@
     <p:sldId id="259" r:id="rId6"/>
     <p:sldId id="260" r:id="rId7"/>
     <p:sldId id="261" r:id="rId8"/>
+    <p:sldId id="262" r:id="rId9"/>
   </p:sldIdLst>
   <p:sldSz cx="9144000" cy="5143500"/>
   <p:notesSz cx="7559675" cy="10691812"/>
@@ -69,7 +70,7 @@
         <p:spPr>
           <a:xfrm>
             <a:off x="311760" y="744480"/>
-            <a:ext cx="8519760" cy="2052000"/>
+            <a:ext cx="8519400" cy="2051640"/>
           </a:xfrm>
           <a:prstGeom prst="rect">
             <a:avLst/>
@@ -100,7 +101,7 @@
         <p:spPr>
           <a:xfrm>
             <a:off x="457200" y="1203480"/>
-            <a:ext cx="8229240" cy="1422720"/>
+            <a:ext cx="8228880" cy="1422360"/>
           </a:xfrm>
           <a:prstGeom prst="rect">
             <a:avLst/>
@@ -129,8 +130,8 @@
         </p:nvSpPr>
         <p:spPr>
           <a:xfrm>
-            <a:off x="457200" y="2761920"/>
-            <a:ext cx="8229240" cy="1422720"/>
+            <a:off x="457200" y="2761200"/>
+            <a:ext cx="8228880" cy="1422360"/>
           </a:xfrm>
           <a:prstGeom prst="rect">
             <a:avLst/>
@@ -182,7 +183,7 @@
         <p:spPr>
           <a:xfrm>
             <a:off x="311760" y="744480"/>
-            <a:ext cx="8519760" cy="2052000"/>
+            <a:ext cx="8519400" cy="2051640"/>
           </a:xfrm>
           <a:prstGeom prst="rect">
             <a:avLst/>
@@ -213,7 +214,7 @@
         <p:spPr>
           <a:xfrm>
             <a:off x="457200" y="1203480"/>
-            <a:ext cx="4015800" cy="1422720"/>
+            <a:ext cx="4015440" cy="1422360"/>
           </a:xfrm>
           <a:prstGeom prst="rect">
             <a:avLst/>
@@ -242,8 +243,8 @@
         </p:nvSpPr>
         <p:spPr>
           <a:xfrm>
-            <a:off x="4674240" y="1203480"/>
-            <a:ext cx="4015800" cy="1422720"/>
+            <a:off x="4673880" y="1203480"/>
+            <a:ext cx="4015440" cy="1422360"/>
           </a:xfrm>
           <a:prstGeom prst="rect">
             <a:avLst/>
@@ -272,8 +273,8 @@
         </p:nvSpPr>
         <p:spPr>
           <a:xfrm>
-            <a:off x="457200" y="2761920"/>
-            <a:ext cx="4015800" cy="1422720"/>
+            <a:off x="457200" y="2761200"/>
+            <a:ext cx="4015440" cy="1422360"/>
           </a:xfrm>
           <a:prstGeom prst="rect">
             <a:avLst/>
@@ -302,8 +303,8 @@
         </p:nvSpPr>
         <p:spPr>
           <a:xfrm>
-            <a:off x="4674240" y="2761920"/>
-            <a:ext cx="4015800" cy="1422720"/>
+            <a:off x="4673880" y="2761200"/>
+            <a:ext cx="4015440" cy="1422360"/>
           </a:xfrm>
           <a:prstGeom prst="rect">
             <a:avLst/>
@@ -355,7 +356,7 @@
         <p:spPr>
           <a:xfrm>
             <a:off x="311760" y="744480"/>
-            <a:ext cx="8519760" cy="2052000"/>
+            <a:ext cx="8519400" cy="2051640"/>
           </a:xfrm>
           <a:prstGeom prst="rect">
             <a:avLst/>
@@ -386,7 +387,7 @@
         <p:spPr>
           <a:xfrm>
             <a:off x="457200" y="1203480"/>
-            <a:ext cx="2649600" cy="1422720"/>
+            <a:ext cx="2649600" cy="1422360"/>
           </a:xfrm>
           <a:prstGeom prst="rect">
             <a:avLst/>
@@ -416,7 +417,7 @@
         <p:spPr>
           <a:xfrm>
             <a:off x="3239640" y="1203480"/>
-            <a:ext cx="2649600" cy="1422720"/>
+            <a:ext cx="2649600" cy="1422360"/>
           </a:xfrm>
           <a:prstGeom prst="rect">
             <a:avLst/>
@@ -446,7 +447,7 @@
         <p:spPr>
           <a:xfrm>
             <a:off x="6022080" y="1203480"/>
-            <a:ext cx="2649600" cy="1422720"/>
+            <a:ext cx="2649600" cy="1422360"/>
           </a:xfrm>
           <a:prstGeom prst="rect">
             <a:avLst/>
@@ -475,8 +476,8 @@
         </p:nvSpPr>
         <p:spPr>
           <a:xfrm>
-            <a:off x="457200" y="2761920"/>
-            <a:ext cx="2649600" cy="1422720"/>
+            <a:off x="457200" y="2761200"/>
+            <a:ext cx="2649600" cy="1422360"/>
           </a:xfrm>
           <a:prstGeom prst="rect">
             <a:avLst/>
@@ -505,8 +506,8 @@
         </p:nvSpPr>
         <p:spPr>
           <a:xfrm>
-            <a:off x="3239640" y="2761920"/>
-            <a:ext cx="2649600" cy="1422720"/>
+            <a:off x="3239640" y="2761200"/>
+            <a:ext cx="2649600" cy="1422360"/>
           </a:xfrm>
           <a:prstGeom prst="rect">
             <a:avLst/>
@@ -535,8 +536,8 @@
         </p:nvSpPr>
         <p:spPr>
           <a:xfrm>
-            <a:off x="6022080" y="2761920"/>
-            <a:ext cx="2649600" cy="1422720"/>
+            <a:off x="6022080" y="2761200"/>
+            <a:ext cx="2649600" cy="1422360"/>
           </a:xfrm>
           <a:prstGeom prst="rect">
             <a:avLst/>
@@ -588,7 +589,7 @@
         <p:spPr>
           <a:xfrm>
             <a:off x="311760" y="744480"/>
-            <a:ext cx="8519760" cy="2052000"/>
+            <a:ext cx="8519400" cy="2051640"/>
           </a:xfrm>
           <a:prstGeom prst="rect">
             <a:avLst/>
@@ -619,7 +620,7 @@
         <p:spPr>
           <a:xfrm>
             <a:off x="457200" y="1203480"/>
-            <a:ext cx="8229240" cy="2982960"/>
+            <a:ext cx="8228880" cy="2982600"/>
           </a:xfrm>
           <a:prstGeom prst="rect">
             <a:avLst/>
@@ -672,7 +673,7 @@
         <p:spPr>
           <a:xfrm>
             <a:off x="311760" y="744480"/>
-            <a:ext cx="8519760" cy="2052000"/>
+            <a:ext cx="8519400" cy="2051640"/>
           </a:xfrm>
           <a:prstGeom prst="rect">
             <a:avLst/>
@@ -703,7 +704,7 @@
         <p:spPr>
           <a:xfrm>
             <a:off x="457200" y="1203480"/>
-            <a:ext cx="8229240" cy="2982960"/>
+            <a:ext cx="8228880" cy="2982600"/>
           </a:xfrm>
           <a:prstGeom prst="rect">
             <a:avLst/>
@@ -755,7 +756,7 @@
         <p:spPr>
           <a:xfrm>
             <a:off x="311760" y="744480"/>
-            <a:ext cx="8519760" cy="2052000"/>
+            <a:ext cx="8519400" cy="2051640"/>
           </a:xfrm>
           <a:prstGeom prst="rect">
             <a:avLst/>
@@ -786,7 +787,7 @@
         <p:spPr>
           <a:xfrm>
             <a:off x="457200" y="1203480"/>
-            <a:ext cx="4015800" cy="2982960"/>
+            <a:ext cx="4015440" cy="2982600"/>
           </a:xfrm>
           <a:prstGeom prst="rect">
             <a:avLst/>
@@ -815,8 +816,8 @@
         </p:nvSpPr>
         <p:spPr>
           <a:xfrm>
-            <a:off x="4674240" y="1203480"/>
-            <a:ext cx="4015800" cy="2982960"/>
+            <a:off x="4673880" y="1203480"/>
+            <a:ext cx="4015440" cy="2982600"/>
           </a:xfrm>
           <a:prstGeom prst="rect">
             <a:avLst/>
@@ -868,7 +869,7 @@
         <p:spPr>
           <a:xfrm>
             <a:off x="311760" y="744480"/>
-            <a:ext cx="8519760" cy="2052000"/>
+            <a:ext cx="8519400" cy="2051640"/>
           </a:xfrm>
           <a:prstGeom prst="rect">
             <a:avLst/>
@@ -921,7 +922,7 @@
         <p:spPr>
           <a:xfrm>
             <a:off x="311760" y="744480"/>
-            <a:ext cx="8519760" cy="9513000"/>
+            <a:ext cx="8519400" cy="9511560"/>
           </a:xfrm>
           <a:prstGeom prst="rect">
             <a:avLst/>
@@ -974,7 +975,7 @@
         <p:spPr>
           <a:xfrm>
             <a:off x="311760" y="744480"/>
-            <a:ext cx="8519760" cy="2052000"/>
+            <a:ext cx="8519400" cy="2051640"/>
           </a:xfrm>
           <a:prstGeom prst="rect">
             <a:avLst/>
@@ -1005,7 +1006,7 @@
         <p:spPr>
           <a:xfrm>
             <a:off x="457200" y="1203480"/>
-            <a:ext cx="4015800" cy="1422720"/>
+            <a:ext cx="4015440" cy="1422360"/>
           </a:xfrm>
           <a:prstGeom prst="rect">
             <a:avLst/>
@@ -1034,8 +1035,8 @@
         </p:nvSpPr>
         <p:spPr>
           <a:xfrm>
-            <a:off x="4674240" y="1203480"/>
-            <a:ext cx="4015800" cy="2982960"/>
+            <a:off x="4673880" y="1203480"/>
+            <a:ext cx="4015440" cy="2982600"/>
           </a:xfrm>
           <a:prstGeom prst="rect">
             <a:avLst/>
@@ -1064,8 +1065,8 @@
         </p:nvSpPr>
         <p:spPr>
           <a:xfrm>
-            <a:off x="457200" y="2761920"/>
-            <a:ext cx="4015800" cy="1422720"/>
+            <a:off x="457200" y="2761200"/>
+            <a:ext cx="4015440" cy="1422360"/>
           </a:xfrm>
           <a:prstGeom prst="rect">
             <a:avLst/>
@@ -1117,7 +1118,7 @@
         <p:spPr>
           <a:xfrm>
             <a:off x="311760" y="744480"/>
-            <a:ext cx="8519760" cy="2052000"/>
+            <a:ext cx="8519400" cy="2051640"/>
           </a:xfrm>
           <a:prstGeom prst="rect">
             <a:avLst/>
@@ -1148,7 +1149,7 @@
         <p:spPr>
           <a:xfrm>
             <a:off x="457200" y="1203480"/>
-            <a:ext cx="4015800" cy="2982960"/>
+            <a:ext cx="4015440" cy="2982600"/>
           </a:xfrm>
           <a:prstGeom prst="rect">
             <a:avLst/>
@@ -1177,8 +1178,8 @@
         </p:nvSpPr>
         <p:spPr>
           <a:xfrm>
-            <a:off x="4674240" y="1203480"/>
-            <a:ext cx="4015800" cy="1422720"/>
+            <a:off x="4673880" y="1203480"/>
+            <a:ext cx="4015440" cy="1422360"/>
           </a:xfrm>
           <a:prstGeom prst="rect">
             <a:avLst/>
@@ -1207,8 +1208,8 @@
         </p:nvSpPr>
         <p:spPr>
           <a:xfrm>
-            <a:off x="4674240" y="2761920"/>
-            <a:ext cx="4015800" cy="1422720"/>
+            <a:off x="4673880" y="2761200"/>
+            <a:ext cx="4015440" cy="1422360"/>
           </a:xfrm>
           <a:prstGeom prst="rect">
             <a:avLst/>
@@ -1260,7 +1261,7 @@
         <p:spPr>
           <a:xfrm>
             <a:off x="311760" y="744480"/>
-            <a:ext cx="8519760" cy="2052000"/>
+            <a:ext cx="8519400" cy="2051640"/>
           </a:xfrm>
           <a:prstGeom prst="rect">
             <a:avLst/>
@@ -1291,7 +1292,7 @@
         <p:spPr>
           <a:xfrm>
             <a:off x="457200" y="1203480"/>
-            <a:ext cx="4015800" cy="1422720"/>
+            <a:ext cx="4015440" cy="1422360"/>
           </a:xfrm>
           <a:prstGeom prst="rect">
             <a:avLst/>
@@ -1320,8 +1321,8 @@
         </p:nvSpPr>
         <p:spPr>
           <a:xfrm>
-            <a:off x="4674240" y="1203480"/>
-            <a:ext cx="4015800" cy="1422720"/>
+            <a:off x="4673880" y="1203480"/>
+            <a:ext cx="4015440" cy="1422360"/>
           </a:xfrm>
           <a:prstGeom prst="rect">
             <a:avLst/>
@@ -1350,8 +1351,8 @@
         </p:nvSpPr>
         <p:spPr>
           <a:xfrm>
-            <a:off x="457200" y="2761920"/>
-            <a:ext cx="8229240" cy="1422720"/>
+            <a:off x="457200" y="2761200"/>
+            <a:ext cx="8228880" cy="1422360"/>
           </a:xfrm>
           <a:prstGeom prst="rect">
             <a:avLst/>
@@ -1410,7 +1411,7 @@
         <p:spPr>
           <a:xfrm>
             <a:off x="311760" y="744480"/>
-            <a:ext cx="8519760" cy="2052000"/>
+            <a:ext cx="8519400" cy="2051640"/>
           </a:xfrm>
           <a:prstGeom prst="rect">
             <a:avLst/>
@@ -1446,7 +1447,7 @@
         <p:spPr>
           <a:xfrm>
             <a:off x="457200" y="1203480"/>
-            <a:ext cx="8229240" cy="2982960"/>
+            <a:ext cx="8228880" cy="2982600"/>
           </a:xfrm>
           <a:prstGeom prst="rect">
             <a:avLst/>
@@ -1469,12 +1470,12 @@
               <a:buChar char=""/>
             </a:pPr>
             <a:r>
-              <a:rPr b="0" lang="en-GB" sz="3200" spc="-1" strike="noStrike">
+              <a:rPr b="0" lang="en-GB" sz="1800" spc="-1" strike="noStrike">
                 <a:latin typeface="Arial"/>
               </a:rPr>
               <a:t>Click to edit the outline text format</a:t>
             </a:r>
-            <a:endParaRPr b="0" lang="en-GB" sz="3200" spc="-1" strike="noStrike">
+            <a:endParaRPr b="0" lang="en-GB" sz="1800" spc="-1" strike="noStrike">
               <a:latin typeface="Arial"/>
             </a:endParaRPr>
           </a:p>
@@ -1491,12 +1492,12 @@
               <a:buChar char=""/>
             </a:pPr>
             <a:r>
-              <a:rPr b="0" lang="en-GB" sz="2800" spc="-1" strike="noStrike">
+              <a:rPr b="0" lang="en-GB" sz="1800" spc="-1" strike="noStrike">
                 <a:latin typeface="Arial"/>
               </a:rPr>
               <a:t>Second Outline Level</a:t>
             </a:r>
-            <a:endParaRPr b="0" lang="en-GB" sz="2800" spc="-1" strike="noStrike">
+            <a:endParaRPr b="0" lang="en-GB" sz="1800" spc="-1" strike="noStrike">
               <a:latin typeface="Arial"/>
             </a:endParaRPr>
           </a:p>
@@ -1513,12 +1514,12 @@
               <a:buChar char=""/>
             </a:pPr>
             <a:r>
-              <a:rPr b="0" lang="en-GB" sz="2400" spc="-1" strike="noStrike">
+              <a:rPr b="0" lang="en-GB" sz="1800" spc="-1" strike="noStrike">
                 <a:latin typeface="Arial"/>
               </a:rPr>
               <a:t>Third Outline Level</a:t>
             </a:r>
-            <a:endParaRPr b="0" lang="en-GB" sz="2400" spc="-1" strike="noStrike">
+            <a:endParaRPr b="0" lang="en-GB" sz="1800" spc="-1" strike="noStrike">
               <a:latin typeface="Arial"/>
             </a:endParaRPr>
           </a:p>
@@ -1535,12 +1536,12 @@
               <a:buChar char=""/>
             </a:pPr>
             <a:r>
-              <a:rPr b="0" lang="en-GB" sz="2000" spc="-1" strike="noStrike">
+              <a:rPr b="0" lang="en-GB" sz="1800" spc="-1" strike="noStrike">
                 <a:latin typeface="Arial"/>
               </a:rPr>
               <a:t>Fourth Outline Level</a:t>
             </a:r>
-            <a:endParaRPr b="0" lang="en-GB" sz="2000" spc="-1" strike="noStrike">
+            <a:endParaRPr b="0" lang="en-GB" sz="1800" spc="-1" strike="noStrike">
               <a:latin typeface="Arial"/>
             </a:endParaRPr>
           </a:p>
@@ -1557,12 +1558,12 @@
               <a:buChar char=""/>
             </a:pPr>
             <a:r>
-              <a:rPr b="0" lang="en-GB" sz="2000" spc="-1" strike="noStrike">
+              <a:rPr b="0" lang="en-GB" sz="1800" spc="-1" strike="noStrike">
                 <a:latin typeface="Arial"/>
               </a:rPr>
               <a:t>Fifth Outline Level</a:t>
             </a:r>
-            <a:endParaRPr b="0" lang="en-GB" sz="2000" spc="-1" strike="noStrike">
+            <a:endParaRPr b="0" lang="en-GB" sz="1800" spc="-1" strike="noStrike">
               <a:latin typeface="Arial"/>
             </a:endParaRPr>
           </a:p>
@@ -1579,12 +1580,12 @@
               <a:buChar char=""/>
             </a:pPr>
             <a:r>
-              <a:rPr b="0" lang="en-GB" sz="2000" spc="-1" strike="noStrike">
+              <a:rPr b="0" lang="en-GB" sz="1800" spc="-1" strike="noStrike">
                 <a:latin typeface="Arial"/>
               </a:rPr>
               <a:t>Sixth Outline Level</a:t>
             </a:r>
-            <a:endParaRPr b="0" lang="en-GB" sz="2000" spc="-1" strike="noStrike">
+            <a:endParaRPr b="0" lang="en-GB" sz="1800" spc="-1" strike="noStrike">
               <a:latin typeface="Arial"/>
             </a:endParaRPr>
           </a:p>
@@ -1601,12 +1602,12 @@
               <a:buChar char=""/>
             </a:pPr>
             <a:r>
-              <a:rPr b="0" lang="en-GB" sz="2000" spc="-1" strike="noStrike">
+              <a:rPr b="0" lang="en-GB" sz="1800" spc="-1" strike="noStrike">
                 <a:latin typeface="Arial"/>
               </a:rPr>
               <a:t>Seventh Outline Level</a:t>
             </a:r>
-            <a:endParaRPr b="0" lang="en-GB" sz="2000" spc="-1" strike="noStrike">
+            <a:endParaRPr b="0" lang="en-GB" sz="1800" spc="-1" strike="noStrike">
               <a:latin typeface="Arial"/>
             </a:endParaRPr>
           </a:p>
@@ -1665,7 +1666,7 @@
         <p:spPr>
           <a:xfrm>
             <a:off x="311760" y="145800"/>
-            <a:ext cx="8519760" cy="988560"/>
+            <a:ext cx="8519400" cy="988200"/>
           </a:xfrm>
           <a:prstGeom prst="rect">
             <a:avLst/>
@@ -1718,7 +1719,7 @@
         <p:spPr>
           <a:xfrm>
             <a:off x="311760" y="1362600"/>
-            <a:ext cx="8519760" cy="3530520"/>
+            <a:ext cx="8519400" cy="3530160"/>
           </a:xfrm>
           <a:prstGeom prst="rect">
             <a:avLst/>
@@ -1773,7 +1774,7 @@
         <p:spPr>
           <a:xfrm>
             <a:off x="7788600" y="170640"/>
-            <a:ext cx="1003680" cy="938880"/>
+            <a:ext cx="1003320" cy="938520"/>
           </a:xfrm>
           <a:prstGeom prst="rect">
             <a:avLst/>
@@ -1829,7 +1830,7 @@
         <p:spPr>
           <a:xfrm>
             <a:off x="311760" y="145800"/>
-            <a:ext cx="8519760" cy="988560"/>
+            <a:ext cx="8519400" cy="988200"/>
           </a:xfrm>
           <a:prstGeom prst="rect">
             <a:avLst/>
@@ -1882,7 +1883,7 @@
         <p:spPr>
           <a:xfrm>
             <a:off x="311760" y="1471320"/>
-            <a:ext cx="8519760" cy="3342600"/>
+            <a:ext cx="8519400" cy="3342240"/>
           </a:xfrm>
           <a:prstGeom prst="rect">
             <a:avLst/>
@@ -2117,7 +2118,7 @@
         <p:spPr>
           <a:xfrm>
             <a:off x="7788600" y="170640"/>
-            <a:ext cx="1003680" cy="938880"/>
+            <a:ext cx="1003320" cy="938520"/>
           </a:xfrm>
           <a:prstGeom prst="rect">
             <a:avLst/>
@@ -2173,7 +2174,7 @@
         <p:spPr>
           <a:xfrm>
             <a:off x="311760" y="145800"/>
-            <a:ext cx="8519760" cy="988560"/>
+            <a:ext cx="8519400" cy="988200"/>
           </a:xfrm>
           <a:prstGeom prst="rect">
             <a:avLst/>
@@ -2226,7 +2227,7 @@
         <p:spPr>
           <a:xfrm>
             <a:off x="311760" y="1451520"/>
-            <a:ext cx="8519760" cy="3441600"/>
+            <a:ext cx="8519400" cy="3441240"/>
           </a:xfrm>
           <a:prstGeom prst="rect">
             <a:avLst/>
@@ -2322,7 +2323,7 @@
         <p:spPr>
           <a:xfrm>
             <a:off x="7788600" y="170640"/>
-            <a:ext cx="1003680" cy="938880"/>
+            <a:ext cx="1003320" cy="938520"/>
           </a:xfrm>
           <a:prstGeom prst="rect">
             <a:avLst/>
@@ -2345,7 +2346,7 @@
         <p:spPr>
           <a:xfrm>
             <a:off x="720000" y="2952000"/>
-            <a:ext cx="4423680" cy="1869120"/>
+            <a:ext cx="4423320" cy="1868760"/>
           </a:xfrm>
           <a:prstGeom prst="rect">
             <a:avLst/>
@@ -2368,7 +2369,7 @@
         <p:spPr>
           <a:xfrm>
             <a:off x="5868000" y="2952000"/>
-            <a:ext cx="2340000" cy="1872000"/>
+            <a:ext cx="2339640" cy="1871640"/>
           </a:xfrm>
           <a:prstGeom prst="rect">
             <a:avLst/>
@@ -2424,7 +2425,7 @@
         <p:spPr>
           <a:xfrm>
             <a:off x="311760" y="145800"/>
-            <a:ext cx="8519760" cy="988560"/>
+            <a:ext cx="8519400" cy="988200"/>
           </a:xfrm>
           <a:prstGeom prst="rect">
             <a:avLst/>
@@ -2477,7 +2478,7 @@
         <p:spPr>
           <a:xfrm>
             <a:off x="311760" y="1451520"/>
-            <a:ext cx="8519760" cy="1314720"/>
+            <a:ext cx="8519400" cy="1314360"/>
           </a:xfrm>
           <a:prstGeom prst="rect">
             <a:avLst/>
@@ -2532,7 +2533,7 @@
         <p:spPr>
           <a:xfrm>
             <a:off x="7788600" y="170640"/>
-            <a:ext cx="1003680" cy="938880"/>
+            <a:ext cx="1003320" cy="938520"/>
           </a:xfrm>
           <a:prstGeom prst="rect">
             <a:avLst/>
@@ -2555,7 +2556,7 @@
         <p:spPr>
           <a:xfrm>
             <a:off x="5980320" y="2808000"/>
-            <a:ext cx="2299680" cy="1918440"/>
+            <a:ext cx="2299320" cy="1918080"/>
           </a:xfrm>
           <a:prstGeom prst="rect">
             <a:avLst/>
@@ -2578,7 +2579,7 @@
         <p:spPr>
           <a:xfrm>
             <a:off x="1080000" y="2784600"/>
-            <a:ext cx="2016000" cy="2183400"/>
+            <a:ext cx="2015640" cy="2183040"/>
           </a:xfrm>
           <a:prstGeom prst="rect">
             <a:avLst/>
@@ -2634,7 +2635,7 @@
         <p:spPr>
           <a:xfrm>
             <a:off x="311760" y="145800"/>
-            <a:ext cx="8519760" cy="988560"/>
+            <a:ext cx="8519400" cy="988200"/>
           </a:xfrm>
           <a:prstGeom prst="rect">
             <a:avLst/>
@@ -2663,16 +2664,16 @@
               </a:lnSpc>
             </a:pPr>
             <a:r>
-              <a:rPr b="0" lang="en-GB" sz="4400" spc="-1" strike="noStrike">
+              <a:rPr b="0" lang="en-GB" sz="5200" spc="-1" strike="noStrike">
                 <a:solidFill>
                   <a:srgbClr val="000000"/>
                 </a:solidFill>
                 <a:latin typeface="Arial"/>
                 <a:ea typeface="Arial"/>
               </a:rPr>
-              <a:t>Proposed Implementation</a:t>
-            </a:r>
-            <a:endParaRPr b="0" lang="en-GB" sz="4400" spc="-1" strike="noStrike">
+              <a:t>Prioritisation</a:t>
+            </a:r>
+            <a:endParaRPr b="0" lang="en-GB" sz="5200" spc="-1" strike="noStrike">
               <a:latin typeface="Arial"/>
             </a:endParaRPr>
           </a:p>
@@ -2686,8 +2687,8 @@
         </p:nvSpPr>
         <p:spPr>
           <a:xfrm>
-            <a:off x="311760" y="1263600"/>
-            <a:ext cx="8519760" cy="2362320"/>
+            <a:off x="311760" y="1451520"/>
+            <a:ext cx="8519400" cy="1314360"/>
           </a:xfrm>
           <a:prstGeom prst="rect">
             <a:avLst/>
@@ -2705,7 +2706,7 @@
         </p:style>
         <p:txBody>
           <a:bodyPr lIns="90000" rIns="90000" tIns="91440" bIns="91440">
-            <a:normAutofit fontScale="69000"/>
+            <a:normAutofit/>
           </a:bodyPr>
           <a:p>
             <a:pPr algn="ctr">
@@ -2714,16 +2715,16 @@
               </a:lnSpc>
             </a:pPr>
             <a:r>
-              <a:rPr b="0" lang="en-GB" sz="2800" spc="-1" strike="noStrike">
+              <a:rPr b="0" lang="en-GB" sz="2600" spc="-1" strike="noStrike">
                 <a:solidFill>
                   <a:srgbClr val="595959"/>
                 </a:solidFill>
                 <a:latin typeface="Arial"/>
                 <a:ea typeface="Arial"/>
               </a:rPr>
-              <a:t>My initial proposed implementation was to have an API in Java, supported by JavaScript logic which turned my 4 basic CRUD commands into more interesting functionality to be displayed via HTML with CSS styling. On the backend, my Java API would like to a Java Service and then on to a repository.</a:t>
-            </a:r>
-            <a:endParaRPr b="0" lang="en-GB" sz="2800" spc="-1" strike="noStrike">
+              <a:t>To help me prioritise my tasks and choose which tasks should be additional goals, I used the MOSCOW method. In my Jira, I named my user stories and tasks with moscow, capitalising M for must have, for instance. This provided me with an instant and obvious categorisation.</a:t>
+            </a:r>
+            <a:endParaRPr b="0" lang="en-GB" sz="2600" spc="-1" strike="noStrike">
               <a:latin typeface="Arial"/>
             </a:endParaRPr>
           </a:p>
@@ -2731,7 +2732,7 @@
       </p:sp>
       <p:pic>
         <p:nvPicPr>
-          <p:cNvPr id="56" name="Google Shape;89;p17" descr=""/>
+          <p:cNvPr id="56" name="Google Shape;80;p16" descr=""/>
           <p:cNvPicPr/>
           <p:nvPr/>
         </p:nvPicPr>
@@ -2742,30 +2743,7 @@
         <p:spPr>
           <a:xfrm>
             <a:off x="7788600" y="170640"/>
-            <a:ext cx="1003680" cy="938880"/>
-          </a:xfrm>
-          <a:prstGeom prst="rect">
-            <a:avLst/>
-          </a:prstGeom>
-          <a:ln>
-            <a:noFill/>
-          </a:ln>
-        </p:spPr>
-      </p:pic>
-      <p:pic>
-        <p:nvPicPr>
-          <p:cNvPr id="57" name="" descr=""/>
-          <p:cNvPicPr/>
-          <p:nvPr/>
-        </p:nvPicPr>
-        <p:blipFill>
-          <a:blip r:embed="rId2"/>
-          <a:stretch/>
-        </p:blipFill>
-        <p:spPr>
-          <a:xfrm>
-            <a:off x="6383520" y="3312000"/>
-            <a:ext cx="2448000" cy="1385280"/>
+            <a:ext cx="1003320" cy="938520"/>
           </a:xfrm>
           <a:prstGeom prst="rect">
             <a:avLst/>
@@ -2814,14 +2792,14 @@
       </p:grpSpPr>
       <p:sp>
         <p:nvSpPr>
-          <p:cNvPr id="58" name="CustomShape 1"/>
+          <p:cNvPr id="57" name="CustomShape 1"/>
           <p:cNvSpPr/>
           <p:nvPr/>
         </p:nvSpPr>
         <p:spPr>
           <a:xfrm>
             <a:off x="311760" y="145800"/>
-            <a:ext cx="8519760" cy="988560"/>
+            <a:ext cx="8519400" cy="988200"/>
           </a:xfrm>
           <a:prstGeom prst="rect">
             <a:avLst/>
@@ -2850,31 +2828,31 @@
               </a:lnSpc>
             </a:pPr>
             <a:r>
-              <a:rPr b="0" lang="en-GB" sz="5200" spc="-1" strike="noStrike">
+              <a:rPr b="0" lang="en-GB" sz="4400" spc="-1" strike="noStrike">
                 <a:solidFill>
                   <a:srgbClr val="000000"/>
                 </a:solidFill>
                 <a:latin typeface="Arial"/>
                 <a:ea typeface="Arial"/>
               </a:rPr>
-              <a:t>Project Summary</a:t>
-            </a:r>
-            <a:endParaRPr b="0" lang="en-GB" sz="5200" spc="-1" strike="noStrike">
-              <a:latin typeface="Arial"/>
-            </a:endParaRPr>
-          </a:p>
-        </p:txBody>
-      </p:sp>
-      <p:sp>
-        <p:nvSpPr>
-          <p:cNvPr id="59" name="CustomShape 2"/>
+              <a:t>Proposed Implementation</a:t>
+            </a:r>
+            <a:endParaRPr b="0" lang="en-GB" sz="4400" spc="-1" strike="noStrike">
+              <a:latin typeface="Arial"/>
+            </a:endParaRPr>
+          </a:p>
+        </p:txBody>
+      </p:sp>
+      <p:sp>
+        <p:nvSpPr>
+          <p:cNvPr id="58" name="CustomShape 2"/>
           <p:cNvSpPr/>
           <p:nvPr/>
         </p:nvSpPr>
         <p:spPr>
           <a:xfrm>
-            <a:off x="311760" y="1325520"/>
-            <a:ext cx="8519760" cy="3646440"/>
+            <a:off x="311760" y="1263600"/>
+            <a:ext cx="8519400" cy="2361960"/>
           </a:xfrm>
           <a:prstGeom prst="rect">
             <a:avLst/>
@@ -2892,7 +2870,7 @@
         </p:style>
         <p:txBody>
           <a:bodyPr lIns="90000" rIns="90000" tIns="91440" bIns="91440">
-            <a:normAutofit/>
+            <a:normAutofit fontScale="68000"/>
           </a:bodyPr>
           <a:p>
             <a:pPr algn="ctr">
@@ -2908,7 +2886,7 @@
                 <a:latin typeface="Arial"/>
                 <a:ea typeface="Arial"/>
               </a:rPr>
-              <a:t>In the end, my project is much the same. Proper planning initially resulted in less deviation from my proposal. I learnt a great deal along the way, mostly in code. The linear way I did my commits means that my github commit view is a straight line.</a:t>
+              <a:t>My initial proposed implementation was to have an API in Java, supported by JavaScript logic which turned my 4 basic CRUD commands into more interesting functionality to be displayed via HTML with CSS styling. On the backend, my Java API would like to a Java Service and then on to a repository.</a:t>
             </a:r>
             <a:endParaRPr b="0" lang="en-GB" sz="2800" spc="-1" strike="noStrike">
               <a:latin typeface="Arial"/>
@@ -2918,7 +2896,7 @@
       </p:sp>
       <p:pic>
         <p:nvPicPr>
-          <p:cNvPr id="60" name="Google Shape;141;p24" descr=""/>
+          <p:cNvPr id="59" name="Google Shape;89;p17" descr=""/>
           <p:cNvPicPr/>
           <p:nvPr/>
         </p:nvPicPr>
@@ -2929,7 +2907,194 @@
         <p:spPr>
           <a:xfrm>
             <a:off x="7788600" y="170640"/>
-            <a:ext cx="1003680" cy="938880"/>
+            <a:ext cx="1003320" cy="938520"/>
+          </a:xfrm>
+          <a:prstGeom prst="rect">
+            <a:avLst/>
+          </a:prstGeom>
+          <a:ln>
+            <a:noFill/>
+          </a:ln>
+        </p:spPr>
+      </p:pic>
+      <p:pic>
+        <p:nvPicPr>
+          <p:cNvPr id="60" name="" descr=""/>
+          <p:cNvPicPr/>
+          <p:nvPr/>
+        </p:nvPicPr>
+        <p:blipFill>
+          <a:blip r:embed="rId2"/>
+          <a:stretch/>
+        </p:blipFill>
+        <p:spPr>
+          <a:xfrm>
+            <a:off x="6383520" y="3312000"/>
+            <a:ext cx="2447640" cy="1384920"/>
+          </a:xfrm>
+          <a:prstGeom prst="rect">
+            <a:avLst/>
+          </a:prstGeom>
+          <a:ln>
+            <a:noFill/>
+          </a:ln>
+        </p:spPr>
+      </p:pic>
+    </p:spTree>
+  </p:cSld>
+  <mc:AlternateContent>
+    <mc:Choice Requires="p14">
+      <p:transition spd="slow" p14:dur="2000"/>
+    </mc:Choice>
+    <mc:Fallback>
+      <p:transition spd="slow"/>
+    </mc:Fallback>
+  </mc:AlternateContent>
+</p:sld>
+</file>
+
+<file path=ppt/slides/slide7.xml><?xml version="1.0" encoding="utf-8"?>
+<p:sld xmlns:a="http://schemas.openxmlformats.org/drawingml/2006/main" xmlns:p="http://schemas.openxmlformats.org/presentationml/2006/main" xmlns:r="http://schemas.openxmlformats.org/officeDocument/2006/relationships" xmlns:p14="http://schemas.microsoft.com/office/powerpoint/2010/main" xmlns:p15="http://schemas.microsoft.com/office/powerpoint/2012/main" xmlns:mc="http://schemas.openxmlformats.org/markup-compatibility/2006">
+  <p:cSld>
+    <p:bg>
+      <p:bgPr>
+        <a:solidFill>
+          <a:srgbClr val="cfe2f3"/>
+        </a:solidFill>
+      </p:bgPr>
+    </p:bg>
+    <p:spTree>
+      <p:nvGrpSpPr>
+        <p:cNvPr id="1" name=""/>
+        <p:cNvGrpSpPr/>
+        <p:nvPr/>
+      </p:nvGrpSpPr>
+      <p:grpSpPr>
+        <a:xfrm>
+          <a:off x="0" y="0"/>
+          <a:ext cx="0" cy="0"/>
+          <a:chOff x="0" y="0"/>
+          <a:chExt cx="0" cy="0"/>
+        </a:xfrm>
+      </p:grpSpPr>
+      <p:sp>
+        <p:nvSpPr>
+          <p:cNvPr id="61" name="CustomShape 1"/>
+          <p:cNvSpPr/>
+          <p:nvPr/>
+        </p:nvSpPr>
+        <p:spPr>
+          <a:xfrm>
+            <a:off x="311760" y="145800"/>
+            <a:ext cx="8519400" cy="988200"/>
+          </a:xfrm>
+          <a:prstGeom prst="rect">
+            <a:avLst/>
+          </a:prstGeom>
+          <a:solidFill>
+            <a:srgbClr val="00ffff"/>
+          </a:solidFill>
+          <a:ln>
+            <a:noFill/>
+          </a:ln>
+        </p:spPr>
+        <p:style>
+          <a:lnRef idx="0"/>
+          <a:fillRef idx="0"/>
+          <a:effectRef idx="0"/>
+          <a:fontRef idx="minor"/>
+        </p:style>
+        <p:txBody>
+          <a:bodyPr lIns="90000" rIns="90000" tIns="91440" bIns="91440" anchor="b">
+            <a:normAutofit/>
+          </a:bodyPr>
+          <a:p>
+            <a:pPr algn="ctr">
+              <a:lnSpc>
+                <a:spcPct val="100000"/>
+              </a:lnSpc>
+            </a:pPr>
+            <a:r>
+              <a:rPr b="0" lang="en-GB" sz="5200" spc="-1" strike="noStrike">
+                <a:solidFill>
+                  <a:srgbClr val="000000"/>
+                </a:solidFill>
+                <a:latin typeface="Arial"/>
+                <a:ea typeface="Arial"/>
+              </a:rPr>
+              <a:t>Project Summary</a:t>
+            </a:r>
+            <a:endParaRPr b="0" lang="en-GB" sz="5200" spc="-1" strike="noStrike">
+              <a:latin typeface="Arial"/>
+            </a:endParaRPr>
+          </a:p>
+        </p:txBody>
+      </p:sp>
+      <p:sp>
+        <p:nvSpPr>
+          <p:cNvPr id="62" name="CustomShape 2"/>
+          <p:cNvSpPr/>
+          <p:nvPr/>
+        </p:nvSpPr>
+        <p:spPr>
+          <a:xfrm>
+            <a:off x="311760" y="1325520"/>
+            <a:ext cx="8519400" cy="3646080"/>
+          </a:xfrm>
+          <a:prstGeom prst="rect">
+            <a:avLst/>
+          </a:prstGeom>
+          <a:noFill/>
+          <a:ln>
+            <a:noFill/>
+          </a:ln>
+        </p:spPr>
+        <p:style>
+          <a:lnRef idx="0"/>
+          <a:fillRef idx="0"/>
+          <a:effectRef idx="0"/>
+          <a:fontRef idx="minor"/>
+        </p:style>
+        <p:txBody>
+          <a:bodyPr lIns="90000" rIns="90000" tIns="91440" bIns="91440">
+            <a:normAutofit/>
+          </a:bodyPr>
+          <a:p>
+            <a:pPr algn="ctr">
+              <a:lnSpc>
+                <a:spcPct val="100000"/>
+              </a:lnSpc>
+            </a:pPr>
+            <a:r>
+              <a:rPr b="0" lang="en-GB" sz="2800" spc="-1" strike="noStrike">
+                <a:solidFill>
+                  <a:srgbClr val="595959"/>
+                </a:solidFill>
+                <a:latin typeface="Arial"/>
+                <a:ea typeface="Arial"/>
+              </a:rPr>
+              <a:t>In the end, my project is much the same. Proper planning initially resulted in less deviation from my proposal. I learnt a great deal along the way, mostly in code. The linear way I did my commits means that my github commit view is a straight line.</a:t>
+            </a:r>
+            <a:endParaRPr b="0" lang="en-GB" sz="2800" spc="-1" strike="noStrike">
+              <a:latin typeface="Arial"/>
+            </a:endParaRPr>
+          </a:p>
+        </p:txBody>
+      </p:sp>
+      <p:pic>
+        <p:nvPicPr>
+          <p:cNvPr id="63" name="Google Shape;141;p24" descr=""/>
+          <p:cNvPicPr/>
+          <p:nvPr/>
+        </p:nvPicPr>
+        <p:blipFill>
+          <a:blip r:embed="rId1"/>
+          <a:stretch/>
+        </p:blipFill>
+        <p:spPr>
+          <a:xfrm>
+            <a:off x="7788600" y="170640"/>
+            <a:ext cx="1003320" cy="938520"/>
           </a:xfrm>
           <a:prstGeom prst="rect">
             <a:avLst/>

</xml_diff>